<commit_message>
completed 1st prensentation pptx
</commit_message>
<xml_diff>
--- a/presentation/Pattern Extraction.pptx
+++ b/presentation/Pattern Extraction.pptx
@@ -5,17 +5,20 @@
     <p:sldMasterId id="2147483648" r:id="rId1"/>
   </p:sldMasterIdLst>
   <p:notesMasterIdLst>
-    <p:notesMasterId r:id="rId7"/>
+    <p:notesMasterId r:id="rId10"/>
   </p:notesMasterIdLst>
   <p:handoutMasterIdLst>
-    <p:handoutMasterId r:id="rId8"/>
+    <p:handoutMasterId r:id="rId11"/>
   </p:handoutMasterIdLst>
   <p:sldIdLst>
     <p:sldId id="256" r:id="rId2"/>
     <p:sldId id="257" r:id="rId3"/>
     <p:sldId id="259" r:id="rId4"/>
     <p:sldId id="260" r:id="rId5"/>
-    <p:sldId id="258" r:id="rId6"/>
+    <p:sldId id="261" r:id="rId6"/>
+    <p:sldId id="262" r:id="rId7"/>
+    <p:sldId id="263" r:id="rId8"/>
+    <p:sldId id="258" r:id="rId9"/>
   </p:sldIdLst>
   <p:sldSz cx="12192000" cy="6858000"/>
   <p:notesSz cx="6858000" cy="9144000"/>
@@ -114,7 +117,1627 @@
       </a:defRPr>
     </a:lvl9pPr>
   </p:defaultTextStyle>
+  <p:extLst>
+    <p:ext uri="{EFAFB233-063F-42B5-8137-9DF3F51BA10A}">
+      <p15:sldGuideLst xmlns:p15="http://schemas.microsoft.com/office/powerpoint/2012/main"/>
+    </p:ext>
+    <p:ext uri="{2D200454-40CA-4A62-9FC3-DE9A4176ACB9}">
+      <p15:notesGuideLst xmlns:p15="http://schemas.microsoft.com/office/powerpoint/2012/main"/>
+    </p:ext>
+  </p:extLst>
 </p:presentation>
+</file>
+
+<file path=ppt/charts/chart1.xml><?xml version="1.0" encoding="utf-8"?>
+<c:chartSpace xmlns:c="http://schemas.openxmlformats.org/drawingml/2006/chart" xmlns:a="http://schemas.openxmlformats.org/drawingml/2006/main" xmlns:r="http://schemas.openxmlformats.org/officeDocument/2006/relationships">
+  <c:date1904 val="0"/>
+  <c:lang val="fr-FR"/>
+  <c:roundedCorners val="0"/>
+  <mc:AlternateContent xmlns:mc="http://schemas.openxmlformats.org/markup-compatibility/2006">
+    <mc:Choice xmlns:c14="http://schemas.microsoft.com/office/drawing/2007/8/2/chart" Requires="c14">
+      <c14:style val="102"/>
+    </mc:Choice>
+    <mc:Fallback>
+      <c:style val="2"/>
+    </mc:Fallback>
+  </mc:AlternateContent>
+  <c:chart>
+    <c:title>
+      <c:tx>
+        <c:rich>
+          <a:bodyPr rot="0" spcFirstLastPara="1" vertOverflow="ellipsis" vert="horz" wrap="square" anchor="ctr" anchorCtr="1"/>
+          <a:lstStyle/>
+          <a:p>
+            <a:pPr>
+              <a:defRPr sz="1862" b="0" i="0" u="none" strike="noStrike" kern="1200" spc="0" baseline="0">
+                <a:solidFill>
+                  <a:schemeClr val="tx1">
+                    <a:lumMod val="65000"/>
+                    <a:lumOff val="35000"/>
+                  </a:schemeClr>
+                </a:solidFill>
+                <a:latin typeface="+mn-lt"/>
+                <a:ea typeface="+mn-ea"/>
+                <a:cs typeface="+mn-cs"/>
+              </a:defRPr>
+            </a:pPr>
+            <a:r>
+              <a:rPr lang="en-US" sz="1200" dirty="0"/>
+              <a:t>Progression</a:t>
+            </a:r>
+            <a:endParaRPr lang="en-US" dirty="0"/>
+          </a:p>
+        </c:rich>
+      </c:tx>
+      <c:layout/>
+      <c:overlay val="0"/>
+      <c:spPr>
+        <a:noFill/>
+        <a:ln>
+          <a:noFill/>
+        </a:ln>
+        <a:effectLst/>
+      </c:spPr>
+      <c:txPr>
+        <a:bodyPr rot="0" spcFirstLastPara="1" vertOverflow="ellipsis" vert="horz" wrap="square" anchor="ctr" anchorCtr="1"/>
+        <a:lstStyle/>
+        <a:p>
+          <a:pPr>
+            <a:defRPr sz="1862" b="0" i="0" u="none" strike="noStrike" kern="1200" spc="0" baseline="0">
+              <a:solidFill>
+                <a:schemeClr val="tx1">
+                  <a:lumMod val="65000"/>
+                  <a:lumOff val="35000"/>
+                </a:schemeClr>
+              </a:solidFill>
+              <a:latin typeface="+mn-lt"/>
+              <a:ea typeface="+mn-ea"/>
+              <a:cs typeface="+mn-cs"/>
+            </a:defRPr>
+          </a:pPr>
+          <a:endParaRPr lang="fr-FR"/>
+        </a:p>
+      </c:txPr>
+    </c:title>
+    <c:autoTitleDeleted val="0"/>
+    <c:plotArea>
+      <c:layout/>
+      <c:pieChart>
+        <c:varyColors val="1"/>
+        <c:ser>
+          <c:idx val="0"/>
+          <c:order val="0"/>
+          <c:tx>
+            <c:strRef>
+              <c:f>Feuil1!$B$1</c:f>
+              <c:strCache>
+                <c:ptCount val="1"/>
+                <c:pt idx="0">
+                  <c:v>Progression</c:v>
+                </c:pt>
+              </c:strCache>
+            </c:strRef>
+          </c:tx>
+          <c:explosion val="1"/>
+          <c:dPt>
+            <c:idx val="0"/>
+            <c:bubble3D val="0"/>
+            <c:spPr>
+              <a:solidFill>
+                <a:schemeClr val="accent5">
+                  <a:lumMod val="60000"/>
+                  <a:lumOff val="40000"/>
+                </a:schemeClr>
+              </a:solidFill>
+              <a:ln w="19050">
+                <a:solidFill>
+                  <a:schemeClr val="lt1"/>
+                </a:solidFill>
+              </a:ln>
+              <a:effectLst/>
+            </c:spPr>
+          </c:dPt>
+          <c:dPt>
+            <c:idx val="1"/>
+            <c:bubble3D val="0"/>
+            <c:spPr>
+              <a:solidFill>
+                <a:srgbClr val="FF6969"/>
+              </a:solidFill>
+              <a:ln w="19050">
+                <a:solidFill>
+                  <a:schemeClr val="lt1"/>
+                </a:solidFill>
+              </a:ln>
+              <a:effectLst/>
+            </c:spPr>
+          </c:dPt>
+          <c:cat>
+            <c:strRef>
+              <c:f>Feuil1!$A$2:$A$3</c:f>
+              <c:strCache>
+                <c:ptCount val="2"/>
+                <c:pt idx="0">
+                  <c:v>Done</c:v>
+                </c:pt>
+                <c:pt idx="1">
+                  <c:v>To do</c:v>
+                </c:pt>
+              </c:strCache>
+            </c:strRef>
+          </c:cat>
+          <c:val>
+            <c:numRef>
+              <c:f>Feuil1!$B$2:$B$3</c:f>
+              <c:numCache>
+                <c:formatCode>General</c:formatCode>
+                <c:ptCount val="2"/>
+                <c:pt idx="0">
+                  <c:v>0.05</c:v>
+                </c:pt>
+                <c:pt idx="1">
+                  <c:v>1</c:v>
+                </c:pt>
+              </c:numCache>
+            </c:numRef>
+          </c:val>
+        </c:ser>
+        <c:dLbls>
+          <c:showLegendKey val="0"/>
+          <c:showVal val="0"/>
+          <c:showCatName val="0"/>
+          <c:showSerName val="0"/>
+          <c:showPercent val="0"/>
+          <c:showBubbleSize val="0"/>
+          <c:showLeaderLines val="1"/>
+        </c:dLbls>
+        <c:firstSliceAng val="0"/>
+      </c:pieChart>
+      <c:spPr>
+        <a:noFill/>
+        <a:ln>
+          <a:noFill/>
+        </a:ln>
+        <a:effectLst/>
+      </c:spPr>
+    </c:plotArea>
+    <c:legend>
+      <c:legendPos val="b"/>
+      <c:layout/>
+      <c:overlay val="0"/>
+      <c:spPr>
+        <a:noFill/>
+        <a:ln>
+          <a:noFill/>
+        </a:ln>
+        <a:effectLst/>
+      </c:spPr>
+      <c:txPr>
+        <a:bodyPr rot="0" spcFirstLastPara="1" vertOverflow="ellipsis" vert="horz" wrap="square" anchor="ctr" anchorCtr="1"/>
+        <a:lstStyle/>
+        <a:p>
+          <a:pPr>
+            <a:defRPr sz="1197" b="0" i="0" u="none" strike="noStrike" kern="1200" baseline="0">
+              <a:solidFill>
+                <a:schemeClr val="tx1">
+                  <a:lumMod val="65000"/>
+                  <a:lumOff val="35000"/>
+                </a:schemeClr>
+              </a:solidFill>
+              <a:latin typeface="+mn-lt"/>
+              <a:ea typeface="+mn-ea"/>
+              <a:cs typeface="+mn-cs"/>
+            </a:defRPr>
+          </a:pPr>
+          <a:endParaRPr lang="fr-FR"/>
+        </a:p>
+      </c:txPr>
+    </c:legend>
+    <c:plotVisOnly val="1"/>
+    <c:dispBlanksAs val="gap"/>
+    <c:showDLblsOverMax val="0"/>
+  </c:chart>
+  <c:spPr>
+    <a:noFill/>
+    <a:ln>
+      <a:noFill/>
+    </a:ln>
+    <a:effectLst/>
+  </c:spPr>
+  <c:txPr>
+    <a:bodyPr/>
+    <a:lstStyle/>
+    <a:p>
+      <a:pPr>
+        <a:defRPr/>
+      </a:pPr>
+      <a:endParaRPr lang="fr-FR"/>
+    </a:p>
+  </c:txPr>
+  <c:externalData r:id="rId3">
+    <c:autoUpdate val="0"/>
+  </c:externalData>
+</c:chartSpace>
+</file>
+
+<file path=ppt/charts/chart2.xml><?xml version="1.0" encoding="utf-8"?>
+<c:chartSpace xmlns:c="http://schemas.openxmlformats.org/drawingml/2006/chart" xmlns:a="http://schemas.openxmlformats.org/drawingml/2006/main" xmlns:r="http://schemas.openxmlformats.org/officeDocument/2006/relationships">
+  <c:date1904 val="0"/>
+  <c:lang val="fr-FR"/>
+  <c:roundedCorners val="0"/>
+  <mc:AlternateContent xmlns:mc="http://schemas.openxmlformats.org/markup-compatibility/2006">
+    <mc:Choice xmlns:c14="http://schemas.microsoft.com/office/drawing/2007/8/2/chart" Requires="c14">
+      <c14:style val="102"/>
+    </mc:Choice>
+    <mc:Fallback>
+      <c:style val="2"/>
+    </mc:Fallback>
+  </mc:AlternateContent>
+  <c:chart>
+    <c:title>
+      <c:tx>
+        <c:rich>
+          <a:bodyPr rot="0" spcFirstLastPara="1" vertOverflow="ellipsis" vert="horz" wrap="square" anchor="ctr" anchorCtr="1"/>
+          <a:lstStyle/>
+          <a:p>
+            <a:pPr>
+              <a:defRPr sz="1862" b="0" i="0" u="none" strike="noStrike" kern="1200" spc="0" baseline="0">
+                <a:solidFill>
+                  <a:schemeClr val="tx1">
+                    <a:lumMod val="65000"/>
+                    <a:lumOff val="35000"/>
+                  </a:schemeClr>
+                </a:solidFill>
+                <a:latin typeface="+mn-lt"/>
+                <a:ea typeface="+mn-ea"/>
+                <a:cs typeface="+mn-cs"/>
+              </a:defRPr>
+            </a:pPr>
+            <a:r>
+              <a:rPr lang="en-US" sz="1200" dirty="0"/>
+              <a:t>Progression</a:t>
+            </a:r>
+          </a:p>
+        </c:rich>
+      </c:tx>
+      <c:layout/>
+      <c:overlay val="0"/>
+      <c:spPr>
+        <a:noFill/>
+        <a:ln>
+          <a:noFill/>
+        </a:ln>
+        <a:effectLst/>
+      </c:spPr>
+      <c:txPr>
+        <a:bodyPr rot="0" spcFirstLastPara="1" vertOverflow="ellipsis" vert="horz" wrap="square" anchor="ctr" anchorCtr="1"/>
+        <a:lstStyle/>
+        <a:p>
+          <a:pPr>
+            <a:defRPr sz="1862" b="0" i="0" u="none" strike="noStrike" kern="1200" spc="0" baseline="0">
+              <a:solidFill>
+                <a:schemeClr val="tx1">
+                  <a:lumMod val="65000"/>
+                  <a:lumOff val="35000"/>
+                </a:schemeClr>
+              </a:solidFill>
+              <a:latin typeface="+mn-lt"/>
+              <a:ea typeface="+mn-ea"/>
+              <a:cs typeface="+mn-cs"/>
+            </a:defRPr>
+          </a:pPr>
+          <a:endParaRPr lang="fr-FR"/>
+        </a:p>
+      </c:txPr>
+    </c:title>
+    <c:autoTitleDeleted val="0"/>
+    <c:plotArea>
+      <c:layout/>
+      <c:pieChart>
+        <c:varyColors val="1"/>
+        <c:ser>
+          <c:idx val="0"/>
+          <c:order val="0"/>
+          <c:tx>
+            <c:strRef>
+              <c:f>Feuil1!$B$1</c:f>
+              <c:strCache>
+                <c:ptCount val="1"/>
+                <c:pt idx="0">
+                  <c:v>Progression</c:v>
+                </c:pt>
+              </c:strCache>
+            </c:strRef>
+          </c:tx>
+          <c:dPt>
+            <c:idx val="0"/>
+            <c:bubble3D val="0"/>
+            <c:spPr>
+              <a:solidFill>
+                <a:schemeClr val="accent5">
+                  <a:lumMod val="60000"/>
+                  <a:lumOff val="40000"/>
+                </a:schemeClr>
+              </a:solidFill>
+              <a:ln w="19050">
+                <a:solidFill>
+                  <a:schemeClr val="lt1"/>
+                </a:solidFill>
+              </a:ln>
+              <a:effectLst/>
+            </c:spPr>
+          </c:dPt>
+          <c:dPt>
+            <c:idx val="1"/>
+            <c:bubble3D val="0"/>
+            <c:spPr>
+              <a:solidFill>
+                <a:srgbClr val="FF6969"/>
+              </a:solidFill>
+              <a:ln w="19050">
+                <a:solidFill>
+                  <a:schemeClr val="lt1"/>
+                </a:solidFill>
+              </a:ln>
+              <a:effectLst/>
+            </c:spPr>
+          </c:dPt>
+          <c:dPt>
+            <c:idx val="2"/>
+            <c:bubble3D val="0"/>
+            <c:spPr>
+              <a:solidFill>
+                <a:schemeClr val="bg1">
+                  <a:lumMod val="75000"/>
+                </a:schemeClr>
+              </a:solidFill>
+              <a:ln w="19050">
+                <a:solidFill>
+                  <a:schemeClr val="lt1"/>
+                </a:solidFill>
+              </a:ln>
+              <a:effectLst/>
+            </c:spPr>
+          </c:dPt>
+          <c:cat>
+            <c:strRef>
+              <c:f>Feuil1!$A$2:$A$4</c:f>
+              <c:strCache>
+                <c:ptCount val="3"/>
+                <c:pt idx="0">
+                  <c:v>Done</c:v>
+                </c:pt>
+                <c:pt idx="1">
+                  <c:v>To do</c:v>
+                </c:pt>
+                <c:pt idx="2">
+                  <c:v>Incertitude</c:v>
+                </c:pt>
+              </c:strCache>
+            </c:strRef>
+          </c:cat>
+          <c:val>
+            <c:numRef>
+              <c:f>Feuil1!$B$2:$B$4</c:f>
+              <c:numCache>
+                <c:formatCode>General</c:formatCode>
+                <c:ptCount val="3"/>
+                <c:pt idx="0">
+                  <c:v>0.375</c:v>
+                </c:pt>
+                <c:pt idx="1">
+                  <c:v>0.375</c:v>
+                </c:pt>
+                <c:pt idx="2">
+                  <c:v>0.25</c:v>
+                </c:pt>
+              </c:numCache>
+            </c:numRef>
+          </c:val>
+        </c:ser>
+        <c:dLbls>
+          <c:showLegendKey val="0"/>
+          <c:showVal val="0"/>
+          <c:showCatName val="0"/>
+          <c:showSerName val="0"/>
+          <c:showPercent val="0"/>
+          <c:showBubbleSize val="0"/>
+          <c:showLeaderLines val="1"/>
+        </c:dLbls>
+        <c:firstSliceAng val="0"/>
+      </c:pieChart>
+      <c:spPr>
+        <a:noFill/>
+        <a:ln>
+          <a:noFill/>
+        </a:ln>
+        <a:effectLst/>
+      </c:spPr>
+    </c:plotArea>
+    <c:legend>
+      <c:legendPos val="b"/>
+      <c:layout>
+        <c:manualLayout>
+          <c:xMode val="edge"/>
+          <c:yMode val="edge"/>
+          <c:x val="0.26216522173389767"/>
+          <c:y val="0.8203241660382995"/>
+          <c:w val="0.50868833758887066"/>
+          <c:h val="0.13256095377290369"/>
+        </c:manualLayout>
+      </c:layout>
+      <c:overlay val="0"/>
+      <c:spPr>
+        <a:noFill/>
+        <a:ln>
+          <a:noFill/>
+        </a:ln>
+        <a:effectLst/>
+      </c:spPr>
+      <c:txPr>
+        <a:bodyPr rot="0" spcFirstLastPara="1" vertOverflow="ellipsis" vert="horz" wrap="square" anchor="ctr" anchorCtr="1"/>
+        <a:lstStyle/>
+        <a:p>
+          <a:pPr>
+            <a:defRPr sz="1197" b="0" i="0" u="none" strike="noStrike" kern="1200" baseline="0">
+              <a:solidFill>
+                <a:schemeClr val="tx1">
+                  <a:lumMod val="65000"/>
+                  <a:lumOff val="35000"/>
+                </a:schemeClr>
+              </a:solidFill>
+              <a:latin typeface="+mn-lt"/>
+              <a:ea typeface="+mn-ea"/>
+              <a:cs typeface="+mn-cs"/>
+            </a:defRPr>
+          </a:pPr>
+          <a:endParaRPr lang="fr-FR"/>
+        </a:p>
+      </c:txPr>
+    </c:legend>
+    <c:plotVisOnly val="1"/>
+    <c:dispBlanksAs val="gap"/>
+    <c:showDLblsOverMax val="0"/>
+  </c:chart>
+  <c:spPr>
+    <a:noFill/>
+    <a:ln>
+      <a:noFill/>
+    </a:ln>
+    <a:effectLst/>
+  </c:spPr>
+  <c:txPr>
+    <a:bodyPr/>
+    <a:lstStyle/>
+    <a:p>
+      <a:pPr>
+        <a:defRPr/>
+      </a:pPr>
+      <a:endParaRPr lang="fr-FR"/>
+    </a:p>
+  </c:txPr>
+  <c:externalData r:id="rId3">
+    <c:autoUpdate val="0"/>
+  </c:externalData>
+</c:chartSpace>
+</file>
+
+<file path=ppt/charts/colors1.xml><?xml version="1.0" encoding="utf-8"?>
+<cs:colorStyle xmlns:cs="http://schemas.microsoft.com/office/drawing/2012/chartStyle" xmlns:a="http://schemas.openxmlformats.org/drawingml/2006/main" meth="cycle" id="10">
+  <a:schemeClr val="accent1"/>
+  <a:schemeClr val="accent2"/>
+  <a:schemeClr val="accent3"/>
+  <a:schemeClr val="accent4"/>
+  <a:schemeClr val="accent5"/>
+  <a:schemeClr val="accent6"/>
+  <cs:variation/>
+  <cs:variation>
+    <a:lumMod val="60000"/>
+  </cs:variation>
+  <cs:variation>
+    <a:lumMod val="80000"/>
+    <a:lumOff val="20000"/>
+  </cs:variation>
+  <cs:variation>
+    <a:lumMod val="80000"/>
+  </cs:variation>
+  <cs:variation>
+    <a:lumMod val="60000"/>
+    <a:lumOff val="40000"/>
+  </cs:variation>
+  <cs:variation>
+    <a:lumMod val="50000"/>
+  </cs:variation>
+  <cs:variation>
+    <a:lumMod val="70000"/>
+    <a:lumOff val="30000"/>
+  </cs:variation>
+  <cs:variation>
+    <a:lumMod val="70000"/>
+  </cs:variation>
+  <cs:variation>
+    <a:lumMod val="50000"/>
+    <a:lumOff val="50000"/>
+  </cs:variation>
+</cs:colorStyle>
+</file>
+
+<file path=ppt/charts/colors2.xml><?xml version="1.0" encoding="utf-8"?>
+<cs:colorStyle xmlns:cs="http://schemas.microsoft.com/office/drawing/2012/chartStyle" xmlns:a="http://schemas.openxmlformats.org/drawingml/2006/main" meth="cycle" id="10">
+  <a:schemeClr val="accent1"/>
+  <a:schemeClr val="accent2"/>
+  <a:schemeClr val="accent3"/>
+  <a:schemeClr val="accent4"/>
+  <a:schemeClr val="accent5"/>
+  <a:schemeClr val="accent6"/>
+  <cs:variation/>
+  <cs:variation>
+    <a:lumMod val="60000"/>
+  </cs:variation>
+  <cs:variation>
+    <a:lumMod val="80000"/>
+    <a:lumOff val="20000"/>
+  </cs:variation>
+  <cs:variation>
+    <a:lumMod val="80000"/>
+  </cs:variation>
+  <cs:variation>
+    <a:lumMod val="60000"/>
+    <a:lumOff val="40000"/>
+  </cs:variation>
+  <cs:variation>
+    <a:lumMod val="50000"/>
+  </cs:variation>
+  <cs:variation>
+    <a:lumMod val="70000"/>
+    <a:lumOff val="30000"/>
+  </cs:variation>
+  <cs:variation>
+    <a:lumMod val="70000"/>
+  </cs:variation>
+  <cs:variation>
+    <a:lumMod val="50000"/>
+    <a:lumOff val="50000"/>
+  </cs:variation>
+</cs:colorStyle>
+</file>
+
+<file path=ppt/charts/style1.xml><?xml version="1.0" encoding="utf-8"?>
+<cs:chartStyle xmlns:cs="http://schemas.microsoft.com/office/drawing/2012/chartStyle" xmlns:a="http://schemas.openxmlformats.org/drawingml/2006/main" id="251">
+  <cs:axisTitle>
+    <cs:lnRef idx="0"/>
+    <cs:fillRef idx="0"/>
+    <cs:effectRef idx="0"/>
+    <cs:fontRef idx="minor">
+      <a:schemeClr val="tx1">
+        <a:lumMod val="65000"/>
+        <a:lumOff val="35000"/>
+      </a:schemeClr>
+    </cs:fontRef>
+    <cs:defRPr sz="1330" kern="1200"/>
+  </cs:axisTitle>
+  <cs:categoryAxis>
+    <cs:lnRef idx="0"/>
+    <cs:fillRef idx="0"/>
+    <cs:effectRef idx="0"/>
+    <cs:fontRef idx="minor">
+      <a:schemeClr val="tx1">
+        <a:lumMod val="65000"/>
+        <a:lumOff val="35000"/>
+      </a:schemeClr>
+    </cs:fontRef>
+    <cs:spPr>
+      <a:ln w="9525" cap="flat" cmpd="sng" algn="ctr">
+        <a:solidFill>
+          <a:schemeClr val="tx1">
+            <a:lumMod val="15000"/>
+            <a:lumOff val="85000"/>
+          </a:schemeClr>
+        </a:solidFill>
+        <a:round/>
+      </a:ln>
+    </cs:spPr>
+    <cs:defRPr sz="1197" kern="1200"/>
+  </cs:categoryAxis>
+  <cs:chartArea mods="allowNoFillOverride allowNoLineOverride">
+    <cs:lnRef idx="0"/>
+    <cs:fillRef idx="0"/>
+    <cs:effectRef idx="0"/>
+    <cs:fontRef idx="minor">
+      <a:schemeClr val="tx1"/>
+    </cs:fontRef>
+    <cs:spPr>
+      <a:solidFill>
+        <a:schemeClr val="bg1"/>
+      </a:solidFill>
+      <a:ln w="9525" cap="flat" cmpd="sng" algn="ctr">
+        <a:solidFill>
+          <a:schemeClr val="tx1">
+            <a:lumMod val="15000"/>
+            <a:lumOff val="85000"/>
+          </a:schemeClr>
+        </a:solidFill>
+        <a:round/>
+      </a:ln>
+    </cs:spPr>
+    <cs:defRPr sz="1197" kern="1200"/>
+  </cs:chartArea>
+  <cs:dataLabel>
+    <cs:lnRef idx="0"/>
+    <cs:fillRef idx="0"/>
+    <cs:effectRef idx="0"/>
+    <cs:fontRef idx="minor">
+      <a:schemeClr val="tx1">
+        <a:lumMod val="75000"/>
+        <a:lumOff val="25000"/>
+      </a:schemeClr>
+    </cs:fontRef>
+    <cs:defRPr sz="1197" kern="1200"/>
+  </cs:dataLabel>
+  <cs:dataLabelCallout>
+    <cs:lnRef idx="0"/>
+    <cs:fillRef idx="0"/>
+    <cs:effectRef idx="0"/>
+    <cs:fontRef idx="minor">
+      <a:schemeClr val="dk1">
+        <a:lumMod val="65000"/>
+        <a:lumOff val="35000"/>
+      </a:schemeClr>
+    </cs:fontRef>
+    <cs:spPr>
+      <a:solidFill>
+        <a:schemeClr val="lt1"/>
+      </a:solidFill>
+      <a:ln>
+        <a:solidFill>
+          <a:schemeClr val="dk1">
+            <a:lumMod val="25000"/>
+            <a:lumOff val="75000"/>
+          </a:schemeClr>
+        </a:solidFill>
+      </a:ln>
+    </cs:spPr>
+    <cs:defRPr sz="1197" kern="1200"/>
+    <cs:bodyPr rot="0" spcFirstLastPara="1" vertOverflow="clip" horzOverflow="clip" vert="horz" wrap="square" lIns="36576" tIns="18288" rIns="36576" bIns="18288" anchor="ctr" anchorCtr="1">
+      <a:spAutoFit/>
+    </cs:bodyPr>
+  </cs:dataLabelCallout>
+  <cs:dataPoint>
+    <cs:lnRef idx="0"/>
+    <cs:fillRef idx="1">
+      <cs:styleClr val="auto"/>
+    </cs:fillRef>
+    <cs:effectRef idx="0"/>
+    <cs:fontRef idx="minor">
+      <a:schemeClr val="tx1"/>
+    </cs:fontRef>
+    <cs:spPr>
+      <a:ln w="19050">
+        <a:solidFill>
+          <a:schemeClr val="lt1"/>
+        </a:solidFill>
+      </a:ln>
+    </cs:spPr>
+  </cs:dataPoint>
+  <cs:dataPoint3D>
+    <cs:lnRef idx="0"/>
+    <cs:fillRef idx="1">
+      <cs:styleClr val="auto"/>
+    </cs:fillRef>
+    <cs:effectRef idx="0"/>
+    <cs:fontRef idx="minor">
+      <a:schemeClr val="tx1"/>
+    </cs:fontRef>
+    <cs:spPr>
+      <a:ln w="25400">
+        <a:solidFill>
+          <a:schemeClr val="lt1"/>
+        </a:solidFill>
+      </a:ln>
+    </cs:spPr>
+  </cs:dataPoint3D>
+  <cs:dataPointLine>
+    <cs:lnRef idx="0">
+      <cs:styleClr val="auto"/>
+    </cs:lnRef>
+    <cs:fillRef idx="0"/>
+    <cs:effectRef idx="0"/>
+    <cs:fontRef idx="minor">
+      <a:schemeClr val="tx1"/>
+    </cs:fontRef>
+    <cs:spPr>
+      <a:ln w="28575" cap="rnd">
+        <a:solidFill>
+          <a:schemeClr val="phClr"/>
+        </a:solidFill>
+        <a:round/>
+      </a:ln>
+    </cs:spPr>
+  </cs:dataPointLine>
+  <cs:dataPointMarker>
+    <cs:lnRef idx="0">
+      <cs:styleClr val="auto"/>
+    </cs:lnRef>
+    <cs:fillRef idx="1">
+      <cs:styleClr val="auto"/>
+    </cs:fillRef>
+    <cs:effectRef idx="0"/>
+    <cs:fontRef idx="minor">
+      <a:schemeClr val="tx1"/>
+    </cs:fontRef>
+    <cs:spPr>
+      <a:ln w="9525">
+        <a:solidFill>
+          <a:schemeClr val="phClr"/>
+        </a:solidFill>
+      </a:ln>
+    </cs:spPr>
+  </cs:dataPointMarker>
+  <cs:dataPointMarkerLayout symbol="circle" size="5"/>
+  <cs:dataPointWireframe>
+    <cs:lnRef idx="0">
+      <cs:styleClr val="auto"/>
+    </cs:lnRef>
+    <cs:fillRef idx="0"/>
+    <cs:effectRef idx="0"/>
+    <cs:fontRef idx="minor">
+      <a:schemeClr val="tx1"/>
+    </cs:fontRef>
+    <cs:spPr>
+      <a:ln w="9525" cap="rnd">
+        <a:solidFill>
+          <a:schemeClr val="phClr"/>
+        </a:solidFill>
+        <a:round/>
+      </a:ln>
+    </cs:spPr>
+  </cs:dataPointWireframe>
+  <cs:dataTable>
+    <cs:lnRef idx="0"/>
+    <cs:fillRef idx="0"/>
+    <cs:effectRef idx="0"/>
+    <cs:fontRef idx="minor">
+      <a:schemeClr val="tx1">
+        <a:lumMod val="65000"/>
+        <a:lumOff val="35000"/>
+      </a:schemeClr>
+    </cs:fontRef>
+    <cs:spPr>
+      <a:noFill/>
+      <a:ln w="9525" cap="flat" cmpd="sng" algn="ctr">
+        <a:solidFill>
+          <a:schemeClr val="tx1">
+            <a:lumMod val="15000"/>
+            <a:lumOff val="85000"/>
+          </a:schemeClr>
+        </a:solidFill>
+        <a:round/>
+      </a:ln>
+    </cs:spPr>
+    <cs:defRPr sz="1197" kern="1200"/>
+  </cs:dataTable>
+  <cs:downBar>
+    <cs:lnRef idx="0"/>
+    <cs:fillRef idx="0"/>
+    <cs:effectRef idx="0"/>
+    <cs:fontRef idx="minor">
+      <a:schemeClr val="tx1"/>
+    </cs:fontRef>
+    <cs:spPr>
+      <a:solidFill>
+        <a:schemeClr val="dk1">
+          <a:lumMod val="75000"/>
+          <a:lumOff val="25000"/>
+        </a:schemeClr>
+      </a:solidFill>
+      <a:ln w="9525" cap="flat" cmpd="sng" algn="ctr">
+        <a:solidFill>
+          <a:schemeClr val="tx1">
+            <a:lumMod val="65000"/>
+            <a:lumOff val="35000"/>
+          </a:schemeClr>
+        </a:solidFill>
+        <a:round/>
+      </a:ln>
+    </cs:spPr>
+  </cs:downBar>
+  <cs:dropLine>
+    <cs:lnRef idx="0"/>
+    <cs:fillRef idx="0"/>
+    <cs:effectRef idx="0"/>
+    <cs:fontRef idx="minor">
+      <a:schemeClr val="tx1"/>
+    </cs:fontRef>
+    <cs:spPr>
+      <a:ln w="9525" cap="flat" cmpd="sng" algn="ctr">
+        <a:solidFill>
+          <a:schemeClr val="tx1">
+            <a:lumMod val="35000"/>
+            <a:lumOff val="65000"/>
+          </a:schemeClr>
+        </a:solidFill>
+        <a:round/>
+      </a:ln>
+    </cs:spPr>
+  </cs:dropLine>
+  <cs:errorBar>
+    <cs:lnRef idx="0"/>
+    <cs:fillRef idx="0"/>
+    <cs:effectRef idx="0"/>
+    <cs:fontRef idx="minor">
+      <a:schemeClr val="tx1"/>
+    </cs:fontRef>
+    <cs:spPr>
+      <a:ln w="9525" cap="flat" cmpd="sng" algn="ctr">
+        <a:solidFill>
+          <a:schemeClr val="tx1">
+            <a:lumMod val="65000"/>
+            <a:lumOff val="35000"/>
+          </a:schemeClr>
+        </a:solidFill>
+        <a:round/>
+      </a:ln>
+    </cs:spPr>
+  </cs:errorBar>
+  <cs:floor>
+    <cs:lnRef idx="0"/>
+    <cs:fillRef idx="0"/>
+    <cs:effectRef idx="0"/>
+    <cs:fontRef idx="minor">
+      <a:schemeClr val="tx1"/>
+    </cs:fontRef>
+    <cs:spPr>
+      <a:noFill/>
+      <a:ln>
+        <a:noFill/>
+      </a:ln>
+    </cs:spPr>
+  </cs:floor>
+  <cs:gridlineMajor>
+    <cs:lnRef idx="0"/>
+    <cs:fillRef idx="0"/>
+    <cs:effectRef idx="0"/>
+    <cs:fontRef idx="minor">
+      <a:schemeClr val="tx1"/>
+    </cs:fontRef>
+    <cs:spPr>
+      <a:ln w="9525" cap="flat" cmpd="sng" algn="ctr">
+        <a:solidFill>
+          <a:schemeClr val="tx1">
+            <a:lumMod val="15000"/>
+            <a:lumOff val="85000"/>
+          </a:schemeClr>
+        </a:solidFill>
+        <a:round/>
+      </a:ln>
+    </cs:spPr>
+  </cs:gridlineMajor>
+  <cs:gridlineMinor>
+    <cs:lnRef idx="0"/>
+    <cs:fillRef idx="0"/>
+    <cs:effectRef idx="0"/>
+    <cs:fontRef idx="minor">
+      <a:schemeClr val="tx1"/>
+    </cs:fontRef>
+    <cs:spPr>
+      <a:ln w="9525" cap="flat" cmpd="sng" algn="ctr">
+        <a:solidFill>
+          <a:schemeClr val="tx1">
+            <a:lumMod val="5000"/>
+            <a:lumOff val="95000"/>
+          </a:schemeClr>
+        </a:solidFill>
+        <a:round/>
+      </a:ln>
+    </cs:spPr>
+  </cs:gridlineMinor>
+  <cs:hiLoLine>
+    <cs:lnRef idx="0"/>
+    <cs:fillRef idx="0"/>
+    <cs:effectRef idx="0"/>
+    <cs:fontRef idx="minor">
+      <a:schemeClr val="tx1"/>
+    </cs:fontRef>
+    <cs:spPr>
+      <a:ln w="9525" cap="flat" cmpd="sng" algn="ctr">
+        <a:solidFill>
+          <a:schemeClr val="tx1">
+            <a:lumMod val="50000"/>
+            <a:lumOff val="50000"/>
+          </a:schemeClr>
+        </a:solidFill>
+        <a:round/>
+      </a:ln>
+    </cs:spPr>
+  </cs:hiLoLine>
+  <cs:leaderLine>
+    <cs:lnRef idx="0"/>
+    <cs:fillRef idx="0"/>
+    <cs:effectRef idx="0"/>
+    <cs:fontRef idx="minor">
+      <a:schemeClr val="tx1"/>
+    </cs:fontRef>
+    <cs:spPr>
+      <a:ln w="9525" cap="flat" cmpd="sng" algn="ctr">
+        <a:solidFill>
+          <a:schemeClr val="tx1">
+            <a:lumMod val="35000"/>
+            <a:lumOff val="65000"/>
+          </a:schemeClr>
+        </a:solidFill>
+        <a:round/>
+      </a:ln>
+    </cs:spPr>
+  </cs:leaderLine>
+  <cs:legend>
+    <cs:lnRef idx="0"/>
+    <cs:fillRef idx="0"/>
+    <cs:effectRef idx="0"/>
+    <cs:fontRef idx="minor">
+      <a:schemeClr val="tx1">
+        <a:lumMod val="65000"/>
+        <a:lumOff val="35000"/>
+      </a:schemeClr>
+    </cs:fontRef>
+    <cs:defRPr sz="1197" kern="1200"/>
+  </cs:legend>
+  <cs:plotArea mods="allowNoFillOverride allowNoLineOverride">
+    <cs:lnRef idx="0"/>
+    <cs:fillRef idx="0"/>
+    <cs:effectRef idx="0"/>
+    <cs:fontRef idx="minor">
+      <a:schemeClr val="tx1"/>
+    </cs:fontRef>
+  </cs:plotArea>
+  <cs:plotArea3D mods="allowNoFillOverride allowNoLineOverride">
+    <cs:lnRef idx="0"/>
+    <cs:fillRef idx="0"/>
+    <cs:effectRef idx="0"/>
+    <cs:fontRef idx="minor">
+      <a:schemeClr val="tx1"/>
+    </cs:fontRef>
+  </cs:plotArea3D>
+  <cs:seriesAxis>
+    <cs:lnRef idx="0"/>
+    <cs:fillRef idx="0"/>
+    <cs:effectRef idx="0"/>
+    <cs:fontRef idx="minor">
+      <a:schemeClr val="tx1">
+        <a:lumMod val="65000"/>
+        <a:lumOff val="35000"/>
+      </a:schemeClr>
+    </cs:fontRef>
+    <cs:defRPr sz="1197" kern="1200"/>
+  </cs:seriesAxis>
+  <cs:seriesLine>
+    <cs:lnRef idx="0"/>
+    <cs:fillRef idx="0"/>
+    <cs:effectRef idx="0"/>
+    <cs:fontRef idx="minor">
+      <a:schemeClr val="tx1"/>
+    </cs:fontRef>
+    <cs:spPr>
+      <a:ln w="9525" cap="flat" cmpd="sng" algn="ctr">
+        <a:solidFill>
+          <a:schemeClr val="tx1">
+            <a:lumMod val="35000"/>
+            <a:lumOff val="65000"/>
+          </a:schemeClr>
+        </a:solidFill>
+        <a:round/>
+      </a:ln>
+    </cs:spPr>
+  </cs:seriesLine>
+  <cs:title>
+    <cs:lnRef idx="0"/>
+    <cs:fillRef idx="0"/>
+    <cs:effectRef idx="0"/>
+    <cs:fontRef idx="minor">
+      <a:schemeClr val="tx1">
+        <a:lumMod val="65000"/>
+        <a:lumOff val="35000"/>
+      </a:schemeClr>
+    </cs:fontRef>
+    <cs:defRPr sz="1862" b="0" kern="1200" spc="0" baseline="0"/>
+  </cs:title>
+  <cs:trendline>
+    <cs:lnRef idx="0">
+      <cs:styleClr val="auto"/>
+    </cs:lnRef>
+    <cs:fillRef idx="0"/>
+    <cs:effectRef idx="0"/>
+    <cs:fontRef idx="minor">
+      <a:schemeClr val="tx1"/>
+    </cs:fontRef>
+    <cs:spPr>
+      <a:ln w="19050" cap="rnd">
+        <a:solidFill>
+          <a:schemeClr val="phClr"/>
+        </a:solidFill>
+        <a:prstDash val="sysDot"/>
+      </a:ln>
+    </cs:spPr>
+  </cs:trendline>
+  <cs:trendlineLabel>
+    <cs:lnRef idx="0"/>
+    <cs:fillRef idx="0"/>
+    <cs:effectRef idx="0"/>
+    <cs:fontRef idx="minor">
+      <a:schemeClr val="tx1">
+        <a:lumMod val="65000"/>
+        <a:lumOff val="35000"/>
+      </a:schemeClr>
+    </cs:fontRef>
+    <cs:defRPr sz="1197" kern="1200"/>
+  </cs:trendlineLabel>
+  <cs:upBar>
+    <cs:lnRef idx="0"/>
+    <cs:fillRef idx="0"/>
+    <cs:effectRef idx="0"/>
+    <cs:fontRef idx="minor">
+      <a:schemeClr val="tx1"/>
+    </cs:fontRef>
+    <cs:spPr>
+      <a:solidFill>
+        <a:schemeClr val="lt1"/>
+      </a:solidFill>
+      <a:ln w="9525" cap="flat" cmpd="sng" algn="ctr">
+        <a:solidFill>
+          <a:schemeClr val="tx1">
+            <a:lumMod val="65000"/>
+            <a:lumOff val="35000"/>
+          </a:schemeClr>
+        </a:solidFill>
+        <a:round/>
+      </a:ln>
+    </cs:spPr>
+  </cs:upBar>
+  <cs:valueAxis>
+    <cs:lnRef idx="0"/>
+    <cs:fillRef idx="0"/>
+    <cs:effectRef idx="0"/>
+    <cs:fontRef idx="minor">
+      <a:schemeClr val="tx1">
+        <a:lumMod val="65000"/>
+        <a:lumOff val="35000"/>
+      </a:schemeClr>
+    </cs:fontRef>
+    <cs:defRPr sz="1197" kern="1200"/>
+  </cs:valueAxis>
+  <cs:wall>
+    <cs:lnRef idx="0"/>
+    <cs:fillRef idx="0"/>
+    <cs:effectRef idx="0"/>
+    <cs:fontRef idx="minor">
+      <a:schemeClr val="tx1"/>
+    </cs:fontRef>
+    <cs:spPr>
+      <a:noFill/>
+      <a:ln>
+        <a:noFill/>
+      </a:ln>
+    </cs:spPr>
+  </cs:wall>
+</cs:chartStyle>
+</file>
+
+<file path=ppt/charts/style2.xml><?xml version="1.0" encoding="utf-8"?>
+<cs:chartStyle xmlns:cs="http://schemas.microsoft.com/office/drawing/2012/chartStyle" xmlns:a="http://schemas.openxmlformats.org/drawingml/2006/main" id="251">
+  <cs:axisTitle>
+    <cs:lnRef idx="0"/>
+    <cs:fillRef idx="0"/>
+    <cs:effectRef idx="0"/>
+    <cs:fontRef idx="minor">
+      <a:schemeClr val="tx1">
+        <a:lumMod val="65000"/>
+        <a:lumOff val="35000"/>
+      </a:schemeClr>
+    </cs:fontRef>
+    <cs:defRPr sz="1330" kern="1200"/>
+  </cs:axisTitle>
+  <cs:categoryAxis>
+    <cs:lnRef idx="0"/>
+    <cs:fillRef idx="0"/>
+    <cs:effectRef idx="0"/>
+    <cs:fontRef idx="minor">
+      <a:schemeClr val="tx1">
+        <a:lumMod val="65000"/>
+        <a:lumOff val="35000"/>
+      </a:schemeClr>
+    </cs:fontRef>
+    <cs:spPr>
+      <a:ln w="9525" cap="flat" cmpd="sng" algn="ctr">
+        <a:solidFill>
+          <a:schemeClr val="tx1">
+            <a:lumMod val="15000"/>
+            <a:lumOff val="85000"/>
+          </a:schemeClr>
+        </a:solidFill>
+        <a:round/>
+      </a:ln>
+    </cs:spPr>
+    <cs:defRPr sz="1197" kern="1200"/>
+  </cs:categoryAxis>
+  <cs:chartArea mods="allowNoFillOverride allowNoLineOverride">
+    <cs:lnRef idx="0"/>
+    <cs:fillRef idx="0"/>
+    <cs:effectRef idx="0"/>
+    <cs:fontRef idx="minor">
+      <a:schemeClr val="tx1"/>
+    </cs:fontRef>
+    <cs:spPr>
+      <a:solidFill>
+        <a:schemeClr val="bg1"/>
+      </a:solidFill>
+      <a:ln w="9525" cap="flat" cmpd="sng" algn="ctr">
+        <a:solidFill>
+          <a:schemeClr val="tx1">
+            <a:lumMod val="15000"/>
+            <a:lumOff val="85000"/>
+          </a:schemeClr>
+        </a:solidFill>
+        <a:round/>
+      </a:ln>
+    </cs:spPr>
+    <cs:defRPr sz="1197" kern="1200"/>
+  </cs:chartArea>
+  <cs:dataLabel>
+    <cs:lnRef idx="0"/>
+    <cs:fillRef idx="0"/>
+    <cs:effectRef idx="0"/>
+    <cs:fontRef idx="minor">
+      <a:schemeClr val="tx1">
+        <a:lumMod val="75000"/>
+        <a:lumOff val="25000"/>
+      </a:schemeClr>
+    </cs:fontRef>
+    <cs:defRPr sz="1197" kern="1200"/>
+  </cs:dataLabel>
+  <cs:dataLabelCallout>
+    <cs:lnRef idx="0"/>
+    <cs:fillRef idx="0"/>
+    <cs:effectRef idx="0"/>
+    <cs:fontRef idx="minor">
+      <a:schemeClr val="dk1">
+        <a:lumMod val="65000"/>
+        <a:lumOff val="35000"/>
+      </a:schemeClr>
+    </cs:fontRef>
+    <cs:spPr>
+      <a:solidFill>
+        <a:schemeClr val="lt1"/>
+      </a:solidFill>
+      <a:ln>
+        <a:solidFill>
+          <a:schemeClr val="dk1">
+            <a:lumMod val="25000"/>
+            <a:lumOff val="75000"/>
+          </a:schemeClr>
+        </a:solidFill>
+      </a:ln>
+    </cs:spPr>
+    <cs:defRPr sz="1197" kern="1200"/>
+    <cs:bodyPr rot="0" spcFirstLastPara="1" vertOverflow="clip" horzOverflow="clip" vert="horz" wrap="square" lIns="36576" tIns="18288" rIns="36576" bIns="18288" anchor="ctr" anchorCtr="1">
+      <a:spAutoFit/>
+    </cs:bodyPr>
+  </cs:dataLabelCallout>
+  <cs:dataPoint>
+    <cs:lnRef idx="0"/>
+    <cs:fillRef idx="1">
+      <cs:styleClr val="auto"/>
+    </cs:fillRef>
+    <cs:effectRef idx="0"/>
+    <cs:fontRef idx="minor">
+      <a:schemeClr val="tx1"/>
+    </cs:fontRef>
+    <cs:spPr>
+      <a:ln w="19050">
+        <a:solidFill>
+          <a:schemeClr val="lt1"/>
+        </a:solidFill>
+      </a:ln>
+    </cs:spPr>
+  </cs:dataPoint>
+  <cs:dataPoint3D>
+    <cs:lnRef idx="0"/>
+    <cs:fillRef idx="1">
+      <cs:styleClr val="auto"/>
+    </cs:fillRef>
+    <cs:effectRef idx="0"/>
+    <cs:fontRef idx="minor">
+      <a:schemeClr val="tx1"/>
+    </cs:fontRef>
+    <cs:spPr>
+      <a:ln w="25400">
+        <a:solidFill>
+          <a:schemeClr val="lt1"/>
+        </a:solidFill>
+      </a:ln>
+    </cs:spPr>
+  </cs:dataPoint3D>
+  <cs:dataPointLine>
+    <cs:lnRef idx="0">
+      <cs:styleClr val="auto"/>
+    </cs:lnRef>
+    <cs:fillRef idx="0"/>
+    <cs:effectRef idx="0"/>
+    <cs:fontRef idx="minor">
+      <a:schemeClr val="tx1"/>
+    </cs:fontRef>
+    <cs:spPr>
+      <a:ln w="28575" cap="rnd">
+        <a:solidFill>
+          <a:schemeClr val="phClr"/>
+        </a:solidFill>
+        <a:round/>
+      </a:ln>
+    </cs:spPr>
+  </cs:dataPointLine>
+  <cs:dataPointMarker>
+    <cs:lnRef idx="0">
+      <cs:styleClr val="auto"/>
+    </cs:lnRef>
+    <cs:fillRef idx="1">
+      <cs:styleClr val="auto"/>
+    </cs:fillRef>
+    <cs:effectRef idx="0"/>
+    <cs:fontRef idx="minor">
+      <a:schemeClr val="tx1"/>
+    </cs:fontRef>
+    <cs:spPr>
+      <a:ln w="9525">
+        <a:solidFill>
+          <a:schemeClr val="phClr"/>
+        </a:solidFill>
+      </a:ln>
+    </cs:spPr>
+  </cs:dataPointMarker>
+  <cs:dataPointMarkerLayout symbol="circle" size="5"/>
+  <cs:dataPointWireframe>
+    <cs:lnRef idx="0">
+      <cs:styleClr val="auto"/>
+    </cs:lnRef>
+    <cs:fillRef idx="0"/>
+    <cs:effectRef idx="0"/>
+    <cs:fontRef idx="minor">
+      <a:schemeClr val="tx1"/>
+    </cs:fontRef>
+    <cs:spPr>
+      <a:ln w="9525" cap="rnd">
+        <a:solidFill>
+          <a:schemeClr val="phClr"/>
+        </a:solidFill>
+        <a:round/>
+      </a:ln>
+    </cs:spPr>
+  </cs:dataPointWireframe>
+  <cs:dataTable>
+    <cs:lnRef idx="0"/>
+    <cs:fillRef idx="0"/>
+    <cs:effectRef idx="0"/>
+    <cs:fontRef idx="minor">
+      <a:schemeClr val="tx1">
+        <a:lumMod val="65000"/>
+        <a:lumOff val="35000"/>
+      </a:schemeClr>
+    </cs:fontRef>
+    <cs:spPr>
+      <a:noFill/>
+      <a:ln w="9525" cap="flat" cmpd="sng" algn="ctr">
+        <a:solidFill>
+          <a:schemeClr val="tx1">
+            <a:lumMod val="15000"/>
+            <a:lumOff val="85000"/>
+          </a:schemeClr>
+        </a:solidFill>
+        <a:round/>
+      </a:ln>
+    </cs:spPr>
+    <cs:defRPr sz="1197" kern="1200"/>
+  </cs:dataTable>
+  <cs:downBar>
+    <cs:lnRef idx="0"/>
+    <cs:fillRef idx="0"/>
+    <cs:effectRef idx="0"/>
+    <cs:fontRef idx="minor">
+      <a:schemeClr val="tx1"/>
+    </cs:fontRef>
+    <cs:spPr>
+      <a:solidFill>
+        <a:schemeClr val="dk1">
+          <a:lumMod val="75000"/>
+          <a:lumOff val="25000"/>
+        </a:schemeClr>
+      </a:solidFill>
+      <a:ln w="9525" cap="flat" cmpd="sng" algn="ctr">
+        <a:solidFill>
+          <a:schemeClr val="tx1">
+            <a:lumMod val="65000"/>
+            <a:lumOff val="35000"/>
+          </a:schemeClr>
+        </a:solidFill>
+        <a:round/>
+      </a:ln>
+    </cs:spPr>
+  </cs:downBar>
+  <cs:dropLine>
+    <cs:lnRef idx="0"/>
+    <cs:fillRef idx="0"/>
+    <cs:effectRef idx="0"/>
+    <cs:fontRef idx="minor">
+      <a:schemeClr val="tx1"/>
+    </cs:fontRef>
+    <cs:spPr>
+      <a:ln w="9525" cap="flat" cmpd="sng" algn="ctr">
+        <a:solidFill>
+          <a:schemeClr val="tx1">
+            <a:lumMod val="35000"/>
+            <a:lumOff val="65000"/>
+          </a:schemeClr>
+        </a:solidFill>
+        <a:round/>
+      </a:ln>
+    </cs:spPr>
+  </cs:dropLine>
+  <cs:errorBar>
+    <cs:lnRef idx="0"/>
+    <cs:fillRef idx="0"/>
+    <cs:effectRef idx="0"/>
+    <cs:fontRef idx="minor">
+      <a:schemeClr val="tx1"/>
+    </cs:fontRef>
+    <cs:spPr>
+      <a:ln w="9525" cap="flat" cmpd="sng" algn="ctr">
+        <a:solidFill>
+          <a:schemeClr val="tx1">
+            <a:lumMod val="65000"/>
+            <a:lumOff val="35000"/>
+          </a:schemeClr>
+        </a:solidFill>
+        <a:round/>
+      </a:ln>
+    </cs:spPr>
+  </cs:errorBar>
+  <cs:floor>
+    <cs:lnRef idx="0"/>
+    <cs:fillRef idx="0"/>
+    <cs:effectRef idx="0"/>
+    <cs:fontRef idx="minor">
+      <a:schemeClr val="tx1"/>
+    </cs:fontRef>
+    <cs:spPr>
+      <a:noFill/>
+      <a:ln>
+        <a:noFill/>
+      </a:ln>
+    </cs:spPr>
+  </cs:floor>
+  <cs:gridlineMajor>
+    <cs:lnRef idx="0"/>
+    <cs:fillRef idx="0"/>
+    <cs:effectRef idx="0"/>
+    <cs:fontRef idx="minor">
+      <a:schemeClr val="tx1"/>
+    </cs:fontRef>
+    <cs:spPr>
+      <a:ln w="9525" cap="flat" cmpd="sng" algn="ctr">
+        <a:solidFill>
+          <a:schemeClr val="tx1">
+            <a:lumMod val="15000"/>
+            <a:lumOff val="85000"/>
+          </a:schemeClr>
+        </a:solidFill>
+        <a:round/>
+      </a:ln>
+    </cs:spPr>
+  </cs:gridlineMajor>
+  <cs:gridlineMinor>
+    <cs:lnRef idx="0"/>
+    <cs:fillRef idx="0"/>
+    <cs:effectRef idx="0"/>
+    <cs:fontRef idx="minor">
+      <a:schemeClr val="tx1"/>
+    </cs:fontRef>
+    <cs:spPr>
+      <a:ln w="9525" cap="flat" cmpd="sng" algn="ctr">
+        <a:solidFill>
+          <a:schemeClr val="tx1">
+            <a:lumMod val="5000"/>
+            <a:lumOff val="95000"/>
+          </a:schemeClr>
+        </a:solidFill>
+        <a:round/>
+      </a:ln>
+    </cs:spPr>
+  </cs:gridlineMinor>
+  <cs:hiLoLine>
+    <cs:lnRef idx="0"/>
+    <cs:fillRef idx="0"/>
+    <cs:effectRef idx="0"/>
+    <cs:fontRef idx="minor">
+      <a:schemeClr val="tx1"/>
+    </cs:fontRef>
+    <cs:spPr>
+      <a:ln w="9525" cap="flat" cmpd="sng" algn="ctr">
+        <a:solidFill>
+          <a:schemeClr val="tx1">
+            <a:lumMod val="50000"/>
+            <a:lumOff val="50000"/>
+          </a:schemeClr>
+        </a:solidFill>
+        <a:round/>
+      </a:ln>
+    </cs:spPr>
+  </cs:hiLoLine>
+  <cs:leaderLine>
+    <cs:lnRef idx="0"/>
+    <cs:fillRef idx="0"/>
+    <cs:effectRef idx="0"/>
+    <cs:fontRef idx="minor">
+      <a:schemeClr val="tx1"/>
+    </cs:fontRef>
+    <cs:spPr>
+      <a:ln w="9525" cap="flat" cmpd="sng" algn="ctr">
+        <a:solidFill>
+          <a:schemeClr val="tx1">
+            <a:lumMod val="35000"/>
+            <a:lumOff val="65000"/>
+          </a:schemeClr>
+        </a:solidFill>
+        <a:round/>
+      </a:ln>
+    </cs:spPr>
+  </cs:leaderLine>
+  <cs:legend>
+    <cs:lnRef idx="0"/>
+    <cs:fillRef idx="0"/>
+    <cs:effectRef idx="0"/>
+    <cs:fontRef idx="minor">
+      <a:schemeClr val="tx1">
+        <a:lumMod val="65000"/>
+        <a:lumOff val="35000"/>
+      </a:schemeClr>
+    </cs:fontRef>
+    <cs:defRPr sz="1197" kern="1200"/>
+  </cs:legend>
+  <cs:plotArea mods="allowNoFillOverride allowNoLineOverride">
+    <cs:lnRef idx="0"/>
+    <cs:fillRef idx="0"/>
+    <cs:effectRef idx="0"/>
+    <cs:fontRef idx="minor">
+      <a:schemeClr val="tx1"/>
+    </cs:fontRef>
+  </cs:plotArea>
+  <cs:plotArea3D mods="allowNoFillOverride allowNoLineOverride">
+    <cs:lnRef idx="0"/>
+    <cs:fillRef idx="0"/>
+    <cs:effectRef idx="0"/>
+    <cs:fontRef idx="minor">
+      <a:schemeClr val="tx1"/>
+    </cs:fontRef>
+  </cs:plotArea3D>
+  <cs:seriesAxis>
+    <cs:lnRef idx="0"/>
+    <cs:fillRef idx="0"/>
+    <cs:effectRef idx="0"/>
+    <cs:fontRef idx="minor">
+      <a:schemeClr val="tx1">
+        <a:lumMod val="65000"/>
+        <a:lumOff val="35000"/>
+      </a:schemeClr>
+    </cs:fontRef>
+    <cs:defRPr sz="1197" kern="1200"/>
+  </cs:seriesAxis>
+  <cs:seriesLine>
+    <cs:lnRef idx="0"/>
+    <cs:fillRef idx="0"/>
+    <cs:effectRef idx="0"/>
+    <cs:fontRef idx="minor">
+      <a:schemeClr val="tx1"/>
+    </cs:fontRef>
+    <cs:spPr>
+      <a:ln w="9525" cap="flat" cmpd="sng" algn="ctr">
+        <a:solidFill>
+          <a:schemeClr val="tx1">
+            <a:lumMod val="35000"/>
+            <a:lumOff val="65000"/>
+          </a:schemeClr>
+        </a:solidFill>
+        <a:round/>
+      </a:ln>
+    </cs:spPr>
+  </cs:seriesLine>
+  <cs:title>
+    <cs:lnRef idx="0"/>
+    <cs:fillRef idx="0"/>
+    <cs:effectRef idx="0"/>
+    <cs:fontRef idx="minor">
+      <a:schemeClr val="tx1">
+        <a:lumMod val="65000"/>
+        <a:lumOff val="35000"/>
+      </a:schemeClr>
+    </cs:fontRef>
+    <cs:defRPr sz="1862" b="0" kern="1200" spc="0" baseline="0"/>
+  </cs:title>
+  <cs:trendline>
+    <cs:lnRef idx="0">
+      <cs:styleClr val="auto"/>
+    </cs:lnRef>
+    <cs:fillRef idx="0"/>
+    <cs:effectRef idx="0"/>
+    <cs:fontRef idx="minor">
+      <a:schemeClr val="tx1"/>
+    </cs:fontRef>
+    <cs:spPr>
+      <a:ln w="19050" cap="rnd">
+        <a:solidFill>
+          <a:schemeClr val="phClr"/>
+        </a:solidFill>
+        <a:prstDash val="sysDot"/>
+      </a:ln>
+    </cs:spPr>
+  </cs:trendline>
+  <cs:trendlineLabel>
+    <cs:lnRef idx="0"/>
+    <cs:fillRef idx="0"/>
+    <cs:effectRef idx="0"/>
+    <cs:fontRef idx="minor">
+      <a:schemeClr val="tx1">
+        <a:lumMod val="65000"/>
+        <a:lumOff val="35000"/>
+      </a:schemeClr>
+    </cs:fontRef>
+    <cs:defRPr sz="1197" kern="1200"/>
+  </cs:trendlineLabel>
+  <cs:upBar>
+    <cs:lnRef idx="0"/>
+    <cs:fillRef idx="0"/>
+    <cs:effectRef idx="0"/>
+    <cs:fontRef idx="minor">
+      <a:schemeClr val="tx1"/>
+    </cs:fontRef>
+    <cs:spPr>
+      <a:solidFill>
+        <a:schemeClr val="lt1"/>
+      </a:solidFill>
+      <a:ln w="9525" cap="flat" cmpd="sng" algn="ctr">
+        <a:solidFill>
+          <a:schemeClr val="tx1">
+            <a:lumMod val="65000"/>
+            <a:lumOff val="35000"/>
+          </a:schemeClr>
+        </a:solidFill>
+        <a:round/>
+      </a:ln>
+    </cs:spPr>
+  </cs:upBar>
+  <cs:valueAxis>
+    <cs:lnRef idx="0"/>
+    <cs:fillRef idx="0"/>
+    <cs:effectRef idx="0"/>
+    <cs:fontRef idx="minor">
+      <a:schemeClr val="tx1">
+        <a:lumMod val="65000"/>
+        <a:lumOff val="35000"/>
+      </a:schemeClr>
+    </cs:fontRef>
+    <cs:defRPr sz="1197" kern="1200"/>
+  </cs:valueAxis>
+  <cs:wall>
+    <cs:lnRef idx="0"/>
+    <cs:fillRef idx="0"/>
+    <cs:effectRef idx="0"/>
+    <cs:fontRef idx="minor">
+      <a:schemeClr val="tx1"/>
+    </cs:fontRef>
+    <cs:spPr>
+      <a:noFill/>
+      <a:ln>
+        <a:noFill/>
+      </a:ln>
+    </cs:spPr>
+  </cs:wall>
+</cs:chartStyle>
 </file>
 
 <file path=ppt/handoutMasters/handoutMaster1.xml><?xml version="1.0" encoding="utf-8"?>
@@ -6729,8 +8352,8 @@
         </p:blipFill>
         <p:spPr bwMode="auto">
           <a:xfrm>
-            <a:off x="2446179" y="1691634"/>
-            <a:ext cx="5058977" cy="4532290"/>
+            <a:off x="287441" y="1480008"/>
+            <a:ext cx="4137745" cy="3706967"/>
           </a:xfrm>
           <a:prstGeom prst="rect">
             <a:avLst/>
@@ -6745,6 +8368,30 @@
               </a14:hiddenFill>
             </a:ext>
           </a:extLst>
+        </p:spPr>
+      </p:pic>
+      <p:pic>
+        <p:nvPicPr>
+          <p:cNvPr id="2" name="Image 1"/>
+          <p:cNvPicPr>
+            <a:picLocks noChangeAspect="1"/>
+          </p:cNvPicPr>
+          <p:nvPr/>
+        </p:nvPicPr>
+        <p:blipFill>
+          <a:blip r:embed="rId3"/>
+          <a:stretch>
+            <a:fillRect/>
+          </a:stretch>
+        </p:blipFill>
+        <p:spPr>
+          <a:xfrm>
+            <a:off x="4559866" y="1158784"/>
+            <a:ext cx="7010400" cy="3943350"/>
+          </a:xfrm>
+          <a:prstGeom prst="rect">
+            <a:avLst/>
+          </a:prstGeom>
         </p:spPr>
       </p:pic>
     </p:spTree>
@@ -6855,7 +8502,7 @@
         </p:blipFill>
         <p:spPr bwMode="auto">
           <a:xfrm>
-            <a:off x="1400002" y="2871257"/>
+            <a:off x="1400002" y="1956855"/>
             <a:ext cx="3024230" cy="1701130"/>
           </a:xfrm>
           <a:prstGeom prst="rect">
@@ -6895,7 +8542,7 @@
         </p:blipFill>
         <p:spPr>
           <a:xfrm>
-            <a:off x="2152650" y="2981325"/>
+            <a:off x="2152650" y="2066923"/>
             <a:ext cx="2438400" cy="1828800"/>
           </a:xfrm>
           <a:prstGeom prst="rect">
@@ -6926,7 +8573,7 @@
         </p:blipFill>
         <p:spPr bwMode="auto">
           <a:xfrm>
-            <a:off x="6198657" y="3014132"/>
+            <a:off x="6198657" y="2099730"/>
             <a:ext cx="2486025" cy="2295526"/>
           </a:xfrm>
           <a:prstGeom prst="rect">
@@ -6952,7 +8599,7 @@
         </p:nvSpPr>
         <p:spPr>
           <a:xfrm>
-            <a:off x="6896100" y="2495820"/>
+            <a:off x="6896100" y="1581418"/>
             <a:ext cx="1619250" cy="400110"/>
           </a:xfrm>
           <a:prstGeom prst="rect">
@@ -6974,6 +8621,50 @@
           </a:p>
         </p:txBody>
       </p:sp>
+      <p:graphicFrame>
+        <p:nvGraphicFramePr>
+          <p:cNvPr id="14" name="Graphique 13"/>
+          <p:cNvGraphicFramePr/>
+          <p:nvPr>
+            <p:extLst>
+              <p:ext uri="{D42A27DB-BD31-4B8C-83A1-F6EECF244321}">
+                <p14:modId xmlns:p14="http://schemas.microsoft.com/office/powerpoint/2010/main" val="659202297"/>
+              </p:ext>
+            </p:extLst>
+          </p:nvPr>
+        </p:nvGraphicFramePr>
+        <p:xfrm>
+          <a:off x="784286" y="4440950"/>
+          <a:ext cx="4255662" cy="1886032"/>
+        </p:xfrm>
+        <a:graphic>
+          <a:graphicData uri="http://schemas.openxmlformats.org/drawingml/2006/chart">
+            <c:chart xmlns:c="http://schemas.openxmlformats.org/drawingml/2006/chart" xmlns:r="http://schemas.openxmlformats.org/officeDocument/2006/relationships" r:id="rId5"/>
+          </a:graphicData>
+        </a:graphic>
+      </p:graphicFrame>
+      <p:graphicFrame>
+        <p:nvGraphicFramePr>
+          <p:cNvPr id="18" name="Graphique 17"/>
+          <p:cNvGraphicFramePr/>
+          <p:nvPr>
+            <p:extLst>
+              <p:ext uri="{D42A27DB-BD31-4B8C-83A1-F6EECF244321}">
+                <p14:modId xmlns:p14="http://schemas.microsoft.com/office/powerpoint/2010/main" val="305500437"/>
+              </p:ext>
+            </p:extLst>
+          </p:nvPr>
+        </p:nvGraphicFramePr>
+        <p:xfrm>
+          <a:off x="4975668" y="4440950"/>
+          <a:ext cx="4615555" cy="1893197"/>
+        </p:xfrm>
+        <a:graphic>
+          <a:graphicData uri="http://schemas.openxmlformats.org/drawingml/2006/chart">
+            <c:chart xmlns:c="http://schemas.openxmlformats.org/drawingml/2006/chart" xmlns:r="http://schemas.openxmlformats.org/officeDocument/2006/relationships" r:id="rId6"/>
+          </a:graphicData>
+        </a:graphic>
+      </p:graphicFrame>
     </p:spTree>
     <p:extLst>
       <p:ext uri="{BB962C8B-B14F-4D97-AF65-F5344CB8AC3E}">
@@ -7020,6 +8711,628 @@
           <a:lstStyle/>
           <a:p>
             <a:r>
+              <a:rPr lang="fr-CH" dirty="0" err="1" smtClean="0"/>
+              <a:t>Recall</a:t>
+            </a:r>
+            <a:r>
+              <a:rPr lang="fr-CH" dirty="0" smtClean="0"/>
+              <a:t> on AST</a:t>
+            </a:r>
+            <a:endParaRPr lang="fr-CH" dirty="0"/>
+          </a:p>
+        </p:txBody>
+      </p:sp>
+      <p:sp>
+        <p:nvSpPr>
+          <p:cNvPr id="3" name="Espace réservé du numéro de diapositive 2"/>
+          <p:cNvSpPr>
+            <a:spLocks noGrp="1"/>
+          </p:cNvSpPr>
+          <p:nvPr>
+            <p:ph type="sldNum" sz="quarter" idx="12"/>
+          </p:nvPr>
+        </p:nvSpPr>
+        <p:spPr/>
+        <p:txBody>
+          <a:bodyPr/>
+          <a:lstStyle/>
+          <a:p>
+            <a:fld id="{D57F1E4F-1CFF-5643-939E-217C01CDF565}" type="slidenum">
+              <a:rPr lang="en-US" smtClean="0"/>
+              <a:pPr/>
+              <a:t>5</a:t>
+            </a:fld>
+            <a:endParaRPr lang="en-US" dirty="0"/>
+          </a:p>
+        </p:txBody>
+      </p:sp>
+      <p:sp>
+        <p:nvSpPr>
+          <p:cNvPr id="10" name="ZoneTexte 9"/>
+          <p:cNvSpPr txBox="1"/>
+          <p:nvPr/>
+        </p:nvSpPr>
+        <p:spPr>
+          <a:xfrm>
+            <a:off x="1904213" y="2995191"/>
+            <a:ext cx="2117887" cy="707886"/>
+          </a:xfrm>
+          <a:prstGeom prst="rect">
+            <a:avLst/>
+          </a:prstGeom>
+          <a:noFill/>
+        </p:spPr>
+        <p:txBody>
+          <a:bodyPr wrap="none" rtlCol="0">
+            <a:spAutoFit/>
+          </a:bodyPr>
+          <a:lstStyle/>
+          <a:p>
+            <a:r>
+              <a:rPr lang="fr-CH" sz="4000" dirty="0" smtClean="0"/>
+              <a:t>x = y + 3</a:t>
+            </a:r>
+            <a:endParaRPr lang="fr-CH" sz="4000" dirty="0"/>
+          </a:p>
+        </p:txBody>
+      </p:sp>
+      <p:sp>
+        <p:nvSpPr>
+          <p:cNvPr id="11" name="ZoneTexte 10"/>
+          <p:cNvSpPr txBox="1"/>
+          <p:nvPr/>
+        </p:nvSpPr>
+        <p:spPr>
+          <a:xfrm>
+            <a:off x="4691834" y="2933635"/>
+            <a:ext cx="837089" cy="830997"/>
+          </a:xfrm>
+          <a:prstGeom prst="rect">
+            <a:avLst/>
+          </a:prstGeom>
+          <a:noFill/>
+        </p:spPr>
+        <p:txBody>
+          <a:bodyPr wrap="none" rtlCol="0">
+            <a:spAutoFit/>
+          </a:bodyPr>
+          <a:lstStyle/>
+          <a:p>
+            <a:r>
+              <a:rPr lang="fr-CH" sz="4800" dirty="0" smtClean="0">
+                <a:sym typeface="Wingdings" panose="05000000000000000000" pitchFamily="2" charset="2"/>
+              </a:rPr>
+              <a:t></a:t>
+            </a:r>
+            <a:endParaRPr lang="fr-CH" sz="4800" dirty="0"/>
+          </a:p>
+        </p:txBody>
+      </p:sp>
+      <p:pic>
+        <p:nvPicPr>
+          <p:cNvPr id="12" name="Picture 8" descr="https://miro.medium.com/max/261/0*ykaApIklGcJ7Qzhw"/>
+          <p:cNvPicPr>
+            <a:picLocks noChangeAspect="1" noChangeArrowheads="1"/>
+          </p:cNvPicPr>
+          <p:nvPr/>
+        </p:nvPicPr>
+        <p:blipFill>
+          <a:blip r:embed="rId2">
+            <a:extLst>
+              <a:ext uri="{28A0092B-C50C-407E-A947-70E740481C1C}">
+                <a14:useLocalDpi xmlns:a14="http://schemas.microsoft.com/office/drawing/2010/main" val="0"/>
+              </a:ext>
+            </a:extLst>
+          </a:blip>
+          <a:srcRect/>
+          <a:stretch>
+            <a:fillRect/>
+          </a:stretch>
+        </p:blipFill>
+        <p:spPr bwMode="auto">
+          <a:xfrm>
+            <a:off x="6198657" y="2099730"/>
+            <a:ext cx="2486025" cy="2295526"/>
+          </a:xfrm>
+          <a:prstGeom prst="rect">
+            <a:avLst/>
+          </a:prstGeom>
+          <a:noFill/>
+          <a:extLst>
+            <a:ext uri="{909E8E84-426E-40DD-AFC4-6F175D3DCCD1}">
+              <a14:hiddenFill xmlns:a14="http://schemas.microsoft.com/office/drawing/2010/main">
+                <a:solidFill>
+                  <a:srgbClr val="FFFFFF"/>
+                </a:solidFill>
+              </a14:hiddenFill>
+            </a:ext>
+          </a:extLst>
+        </p:spPr>
+      </p:pic>
+    </p:spTree>
+    <p:extLst>
+      <p:ext uri="{BB962C8B-B14F-4D97-AF65-F5344CB8AC3E}">
+        <p14:creationId xmlns:p14="http://schemas.microsoft.com/office/powerpoint/2010/main" val="2076153218"/>
+      </p:ext>
+    </p:extLst>
+  </p:cSld>
+  <p:clrMapOvr>
+    <a:masterClrMapping/>
+  </p:clrMapOvr>
+</p:sld>
+</file>
+
+<file path=ppt/slides/slide6.xml><?xml version="1.0" encoding="utf-8"?>
+<p:sld xmlns:a="http://schemas.openxmlformats.org/drawingml/2006/main" xmlns:r="http://schemas.openxmlformats.org/officeDocument/2006/relationships" xmlns:p="http://schemas.openxmlformats.org/presentationml/2006/main">
+  <p:cSld>
+    <p:spTree>
+      <p:nvGrpSpPr>
+        <p:cNvPr id="1" name=""/>
+        <p:cNvGrpSpPr/>
+        <p:nvPr/>
+      </p:nvGrpSpPr>
+      <p:grpSpPr>
+        <a:xfrm>
+          <a:off x="0" y="0"/>
+          <a:ext cx="0" cy="0"/>
+          <a:chOff x="0" y="0"/>
+          <a:chExt cx="0" cy="0"/>
+        </a:xfrm>
+      </p:grpSpPr>
+      <p:sp>
+        <p:nvSpPr>
+          <p:cNvPr id="2" name="Titre 1"/>
+          <p:cNvSpPr>
+            <a:spLocks noGrp="1"/>
+          </p:cNvSpPr>
+          <p:nvPr>
+            <p:ph type="title"/>
+          </p:nvPr>
+        </p:nvSpPr>
+        <p:spPr/>
+        <p:txBody>
+          <a:bodyPr/>
+          <a:lstStyle/>
+          <a:p>
+            <a:r>
+              <a:rPr lang="fr-CH" dirty="0" err="1" smtClean="0"/>
+              <a:t>Visitor</a:t>
+            </a:r>
+            <a:r>
+              <a:rPr lang="fr-CH" dirty="0" smtClean="0"/>
+              <a:t> </a:t>
+            </a:r>
+            <a:r>
+              <a:rPr lang="fr-CH" dirty="0" err="1" smtClean="0"/>
+              <a:t>example</a:t>
+            </a:r>
+            <a:endParaRPr lang="fr-CH" dirty="0"/>
+          </a:p>
+        </p:txBody>
+      </p:sp>
+      <p:sp>
+        <p:nvSpPr>
+          <p:cNvPr id="3" name="Espace réservé du numéro de diapositive 2"/>
+          <p:cNvSpPr>
+            <a:spLocks noGrp="1"/>
+          </p:cNvSpPr>
+          <p:nvPr>
+            <p:ph type="sldNum" sz="quarter" idx="12"/>
+          </p:nvPr>
+        </p:nvSpPr>
+        <p:spPr/>
+        <p:txBody>
+          <a:bodyPr/>
+          <a:lstStyle/>
+          <a:p>
+            <a:fld id="{D57F1E4F-1CFF-5643-939E-217C01CDF565}" type="slidenum">
+              <a:rPr lang="en-US" smtClean="0"/>
+              <a:pPr/>
+              <a:t>6</a:t>
+            </a:fld>
+            <a:endParaRPr lang="en-US" dirty="0"/>
+          </a:p>
+        </p:txBody>
+      </p:sp>
+      <p:sp>
+        <p:nvSpPr>
+          <p:cNvPr id="4" name="Rectangle 3"/>
+          <p:cNvSpPr/>
+          <p:nvPr/>
+        </p:nvSpPr>
+        <p:spPr>
+          <a:xfrm>
+            <a:off x="1188615" y="3044665"/>
+            <a:ext cx="8756664" cy="1323439"/>
+          </a:xfrm>
+          <a:prstGeom prst="rect">
+            <a:avLst/>
+          </a:prstGeom>
+        </p:spPr>
+        <p:txBody>
+          <a:bodyPr wrap="square">
+            <a:spAutoFit/>
+          </a:bodyPr>
+          <a:lstStyle/>
+          <a:p>
+            <a:r>
+              <a:rPr lang="en-US" sz="2000" dirty="0" err="1">
+                <a:solidFill>
+                  <a:srgbClr val="ED0303"/>
+                </a:solidFill>
+                <a:latin typeface="Consolas" panose="020B0609020204030204" pitchFamily="49" charset="0"/>
+              </a:rPr>
+              <a:t>func</a:t>
+            </a:r>
+            <a:r>
+              <a:rPr lang="en-US" sz="2000" dirty="0">
+                <a:solidFill>
+                  <a:srgbClr val="00B0F0"/>
+                </a:solidFill>
+                <a:latin typeface="Consolas" panose="020B0609020204030204" pitchFamily="49" charset="0"/>
+              </a:rPr>
+              <a:t> </a:t>
+            </a:r>
+            <a:r>
+              <a:rPr lang="en-US" sz="2000" dirty="0">
+                <a:solidFill>
+                  <a:srgbClr val="9954CC"/>
+                </a:solidFill>
+                <a:latin typeface="Consolas" panose="020B0609020204030204" pitchFamily="49" charset="0"/>
+              </a:rPr>
+              <a:t>visit</a:t>
+            </a:r>
+            <a:r>
+              <a:rPr lang="en-US" sz="2000" dirty="0">
+                <a:latin typeface="Consolas" panose="020B0609020204030204" pitchFamily="49" charset="0"/>
+              </a:rPr>
+              <a:t>(_ </a:t>
+            </a:r>
+            <a:r>
+              <a:rPr lang="en-US" sz="2000" dirty="0" err="1">
+                <a:latin typeface="Consolas" panose="020B0609020204030204" pitchFamily="49" charset="0"/>
+              </a:rPr>
+              <a:t>stmt</a:t>
+            </a:r>
+            <a:r>
+              <a:rPr lang="en-US" sz="2000" dirty="0">
+                <a:latin typeface="Consolas" panose="020B0609020204030204" pitchFamily="49" charset="0"/>
+              </a:rPr>
+              <a:t>: </a:t>
+            </a:r>
+            <a:r>
+              <a:rPr lang="en-US" sz="2000" dirty="0" err="1">
+                <a:latin typeface="Consolas" panose="020B0609020204030204" pitchFamily="49" charset="0"/>
+              </a:rPr>
+              <a:t>ClosureExpression</a:t>
+            </a:r>
+            <a:r>
+              <a:rPr lang="en-US" sz="2000" dirty="0">
+                <a:latin typeface="Consolas" panose="020B0609020204030204" pitchFamily="49" charset="0"/>
+              </a:rPr>
+              <a:t>) </a:t>
+            </a:r>
+            <a:r>
+              <a:rPr lang="en-US" sz="2000" dirty="0">
+                <a:solidFill>
+                  <a:srgbClr val="ED0303"/>
+                </a:solidFill>
+                <a:latin typeface="Consolas" panose="020B0609020204030204" pitchFamily="49" charset="0"/>
+              </a:rPr>
+              <a:t>throws -&gt;</a:t>
+            </a:r>
+            <a:r>
+              <a:rPr lang="en-US" sz="2000" dirty="0">
+                <a:latin typeface="Consolas" panose="020B0609020204030204" pitchFamily="49" charset="0"/>
+              </a:rPr>
+              <a:t> </a:t>
+            </a:r>
+            <a:r>
+              <a:rPr lang="en-US" sz="2000" dirty="0">
+                <a:solidFill>
+                  <a:srgbClr val="0033CC"/>
+                </a:solidFill>
+                <a:latin typeface="Consolas" panose="020B0609020204030204" pitchFamily="49" charset="0"/>
+              </a:rPr>
+              <a:t>Bool</a:t>
+            </a:r>
+            <a:r>
+              <a:rPr lang="en-US" sz="2000" dirty="0">
+                <a:latin typeface="Consolas" panose="020B0609020204030204" pitchFamily="49" charset="0"/>
+              </a:rPr>
+              <a:t> </a:t>
+            </a:r>
+            <a:r>
+              <a:rPr lang="en-US" sz="2000" dirty="0" smtClean="0">
+                <a:latin typeface="Consolas" panose="020B0609020204030204" pitchFamily="49" charset="0"/>
+              </a:rPr>
+              <a:t>{</a:t>
+            </a:r>
+          </a:p>
+          <a:p>
+            <a:pPr lvl="1"/>
+            <a:r>
+              <a:rPr lang="en-US" sz="2000" dirty="0" smtClean="0">
+                <a:latin typeface="Consolas" panose="020B0609020204030204" pitchFamily="49" charset="0"/>
+              </a:rPr>
+              <a:t>count += </a:t>
+            </a:r>
+            <a:r>
+              <a:rPr lang="en-US" sz="2000" dirty="0">
+                <a:solidFill>
+                  <a:srgbClr val="0033CC"/>
+                </a:solidFill>
+                <a:latin typeface="Consolas" panose="020B0609020204030204" pitchFamily="49" charset="0"/>
+              </a:rPr>
+              <a:t>1 </a:t>
+            </a:r>
+            <a:endParaRPr lang="en-US" sz="2000" dirty="0" smtClean="0">
+              <a:solidFill>
+                <a:srgbClr val="0033CC"/>
+              </a:solidFill>
+              <a:latin typeface="Consolas" panose="020B0609020204030204" pitchFamily="49" charset="0"/>
+            </a:endParaRPr>
+          </a:p>
+          <a:p>
+            <a:pPr lvl="1"/>
+            <a:r>
+              <a:rPr lang="en-US" sz="2000" dirty="0" smtClean="0">
+                <a:solidFill>
+                  <a:srgbClr val="ED0303"/>
+                </a:solidFill>
+                <a:latin typeface="Consolas" panose="020B0609020204030204" pitchFamily="49" charset="0"/>
+              </a:rPr>
+              <a:t>return</a:t>
+            </a:r>
+            <a:r>
+              <a:rPr lang="en-US" sz="2000" dirty="0" smtClean="0">
+                <a:latin typeface="Consolas" panose="020B0609020204030204" pitchFamily="49" charset="0"/>
+              </a:rPr>
+              <a:t> </a:t>
+            </a:r>
+            <a:r>
+              <a:rPr lang="en-US" sz="2000" dirty="0">
+                <a:solidFill>
+                  <a:srgbClr val="0033CC"/>
+                </a:solidFill>
+                <a:latin typeface="Consolas" panose="020B0609020204030204" pitchFamily="49" charset="0"/>
+              </a:rPr>
+              <a:t>true </a:t>
+            </a:r>
+            <a:endParaRPr lang="en-US" sz="2000" dirty="0" smtClean="0">
+              <a:solidFill>
+                <a:srgbClr val="0033CC"/>
+              </a:solidFill>
+              <a:latin typeface="Consolas" panose="020B0609020204030204" pitchFamily="49" charset="0"/>
+            </a:endParaRPr>
+          </a:p>
+          <a:p>
+            <a:r>
+              <a:rPr lang="en-US" sz="2000" dirty="0" smtClean="0">
+                <a:latin typeface="Consolas" panose="020B0609020204030204" pitchFamily="49" charset="0"/>
+              </a:rPr>
+              <a:t>}</a:t>
+            </a:r>
+            <a:endParaRPr lang="fr-CH" sz="2000" dirty="0">
+              <a:latin typeface="Consolas" panose="020B0609020204030204" pitchFamily="49" charset="0"/>
+            </a:endParaRPr>
+          </a:p>
+        </p:txBody>
+      </p:sp>
+    </p:spTree>
+    <p:extLst>
+      <p:ext uri="{BB962C8B-B14F-4D97-AF65-F5344CB8AC3E}">
+        <p14:creationId xmlns:p14="http://schemas.microsoft.com/office/powerpoint/2010/main" val="1966148355"/>
+      </p:ext>
+    </p:extLst>
+  </p:cSld>
+  <p:clrMapOvr>
+    <a:masterClrMapping/>
+  </p:clrMapOvr>
+</p:sld>
+</file>
+
+<file path=ppt/slides/slide7.xml><?xml version="1.0" encoding="utf-8"?>
+<p:sld xmlns:a="http://schemas.openxmlformats.org/drawingml/2006/main" xmlns:r="http://schemas.openxmlformats.org/officeDocument/2006/relationships" xmlns:p="http://schemas.openxmlformats.org/presentationml/2006/main">
+  <p:cSld>
+    <p:spTree>
+      <p:nvGrpSpPr>
+        <p:cNvPr id="1" name=""/>
+        <p:cNvGrpSpPr/>
+        <p:nvPr/>
+      </p:nvGrpSpPr>
+      <p:grpSpPr>
+        <a:xfrm>
+          <a:off x="0" y="0"/>
+          <a:ext cx="0" cy="0"/>
+          <a:chOff x="0" y="0"/>
+          <a:chExt cx="0" cy="0"/>
+        </a:xfrm>
+      </p:grpSpPr>
+      <p:sp>
+        <p:nvSpPr>
+          <p:cNvPr id="2" name="Titre 1"/>
+          <p:cNvSpPr>
+            <a:spLocks noGrp="1"/>
+          </p:cNvSpPr>
+          <p:nvPr>
+            <p:ph type="title"/>
+          </p:nvPr>
+        </p:nvSpPr>
+        <p:spPr/>
+        <p:txBody>
+          <a:bodyPr/>
+          <a:lstStyle/>
+          <a:p>
+            <a:r>
+              <a:rPr lang="fr-CH" dirty="0" err="1" smtClean="0"/>
+              <a:t>Github</a:t>
+            </a:r>
+            <a:r>
+              <a:rPr lang="fr-CH" dirty="0" smtClean="0"/>
+              <a:t> exploration</a:t>
+            </a:r>
+            <a:endParaRPr lang="fr-CH" dirty="0"/>
+          </a:p>
+        </p:txBody>
+      </p:sp>
+      <p:sp>
+        <p:nvSpPr>
+          <p:cNvPr id="3" name="Espace réservé du contenu 2"/>
+          <p:cNvSpPr>
+            <a:spLocks noGrp="1"/>
+          </p:cNvSpPr>
+          <p:nvPr>
+            <p:ph idx="1"/>
+          </p:nvPr>
+        </p:nvSpPr>
+        <p:spPr/>
+        <p:txBody>
+          <a:bodyPr/>
+          <a:lstStyle/>
+          <a:p>
+            <a:r>
+              <a:rPr lang="fr-CH" dirty="0" err="1" smtClean="0"/>
+              <a:t>Maybe</a:t>
+            </a:r>
+            <a:r>
+              <a:rPr lang="fr-CH" dirty="0" smtClean="0"/>
+              <a:t> </a:t>
+            </a:r>
+            <a:r>
+              <a:rPr lang="fr-CH" dirty="0" err="1" smtClean="0"/>
+              <a:t>some</a:t>
+            </a:r>
+            <a:r>
+              <a:rPr lang="fr-CH" dirty="0" smtClean="0"/>
+              <a:t> </a:t>
+            </a:r>
+            <a:r>
+              <a:rPr lang="fr-CH" dirty="0" err="1" smtClean="0"/>
+              <a:t>tools</a:t>
+            </a:r>
+            <a:r>
+              <a:rPr lang="fr-CH" dirty="0" smtClean="0"/>
+              <a:t> </a:t>
+            </a:r>
+            <a:r>
+              <a:rPr lang="fr-CH" dirty="0" err="1" smtClean="0"/>
+              <a:t>already</a:t>
+            </a:r>
+            <a:r>
+              <a:rPr lang="fr-CH" dirty="0" smtClean="0"/>
+              <a:t> </a:t>
+            </a:r>
+            <a:r>
+              <a:rPr lang="fr-CH" dirty="0" err="1" smtClean="0"/>
+              <a:t>exist</a:t>
+            </a:r>
+            <a:endParaRPr lang="fr-CH" dirty="0" smtClean="0"/>
+          </a:p>
+          <a:p>
+            <a:endParaRPr lang="fr-CH" dirty="0"/>
+          </a:p>
+          <a:p>
+            <a:endParaRPr lang="fr-CH" dirty="0" smtClean="0"/>
+          </a:p>
+          <a:p>
+            <a:r>
+              <a:rPr lang="fr-CH" dirty="0" smtClean="0"/>
+              <a:t>Data </a:t>
+            </a:r>
+            <a:r>
+              <a:rPr lang="fr-CH" dirty="0" err="1" smtClean="0"/>
+              <a:t>will</a:t>
+            </a:r>
+            <a:r>
+              <a:rPr lang="fr-CH" dirty="0" smtClean="0"/>
+              <a:t> </a:t>
+            </a:r>
+            <a:r>
+              <a:rPr lang="fr-CH" dirty="0" err="1" smtClean="0"/>
+              <a:t>be</a:t>
+            </a:r>
+            <a:r>
+              <a:rPr lang="fr-CH" dirty="0" smtClean="0"/>
+              <a:t> </a:t>
+            </a:r>
+            <a:r>
+              <a:rPr lang="fr-CH" dirty="0" err="1" smtClean="0"/>
+              <a:t>biased</a:t>
+            </a:r>
+            <a:endParaRPr lang="fr-CH" dirty="0"/>
+          </a:p>
+        </p:txBody>
+      </p:sp>
+      <p:sp>
+        <p:nvSpPr>
+          <p:cNvPr id="4" name="Espace réservé du numéro de diapositive 3"/>
+          <p:cNvSpPr>
+            <a:spLocks noGrp="1"/>
+          </p:cNvSpPr>
+          <p:nvPr>
+            <p:ph type="sldNum" sz="quarter" idx="12"/>
+          </p:nvPr>
+        </p:nvSpPr>
+        <p:spPr/>
+        <p:txBody>
+          <a:bodyPr/>
+          <a:lstStyle/>
+          <a:p>
+            <a:fld id="{519954A3-9DFD-4C44-94BA-B95130A3BA1C}" type="slidenum">
+              <a:rPr lang="en-US" smtClean="0"/>
+              <a:t>7</a:t>
+            </a:fld>
+            <a:endParaRPr lang="en-US" dirty="0"/>
+          </a:p>
+        </p:txBody>
+      </p:sp>
+    </p:spTree>
+    <p:extLst>
+      <p:ext uri="{BB962C8B-B14F-4D97-AF65-F5344CB8AC3E}">
+        <p14:creationId xmlns:p14="http://schemas.microsoft.com/office/powerpoint/2010/main" val="4253915269"/>
+      </p:ext>
+    </p:extLst>
+  </p:cSld>
+  <p:clrMapOvr>
+    <a:masterClrMapping/>
+  </p:clrMapOvr>
+</p:sld>
+</file>
+
+<file path=ppt/slides/slide8.xml><?xml version="1.0" encoding="utf-8"?>
+<p:sld xmlns:a="http://schemas.openxmlformats.org/drawingml/2006/main" xmlns:r="http://schemas.openxmlformats.org/officeDocument/2006/relationships" xmlns:p="http://schemas.openxmlformats.org/presentationml/2006/main">
+  <p:cSld>
+    <p:spTree>
+      <p:nvGrpSpPr>
+        <p:cNvPr id="1" name=""/>
+        <p:cNvGrpSpPr/>
+        <p:nvPr/>
+      </p:nvGrpSpPr>
+      <p:grpSpPr>
+        <a:xfrm>
+          <a:off x="0" y="0"/>
+          <a:ext cx="0" cy="0"/>
+          <a:chOff x="0" y="0"/>
+          <a:chExt cx="0" cy="0"/>
+        </a:xfrm>
+      </p:grpSpPr>
+      <p:sp>
+        <p:nvSpPr>
+          <p:cNvPr id="2" name="Titre 1"/>
+          <p:cNvSpPr>
+            <a:spLocks noGrp="1"/>
+          </p:cNvSpPr>
+          <p:nvPr>
+            <p:ph type="title"/>
+          </p:nvPr>
+        </p:nvSpPr>
+        <p:spPr/>
+        <p:txBody>
+          <a:bodyPr/>
+          <a:lstStyle/>
+          <a:p>
+            <a:r>
               <a:rPr lang="fr-CH" dirty="0" smtClean="0"/>
               <a:t>Sources</a:t>
             </a:r>
@@ -7092,7 +9405,6 @@
               <a:rPr lang="fr-CH" dirty="0"/>
               <a:t>.</a:t>
             </a:r>
-            <a:endParaRPr lang="fr-CH" dirty="0"/>
           </a:p>
         </p:txBody>
       </p:sp>
@@ -7113,7 +9425,7 @@
           <a:p>
             <a:fld id="{519954A3-9DFD-4C44-94BA-B95130A3BA1C}" type="slidenum">
               <a:rPr lang="en-US" smtClean="0"/>
-              <a:t>5</a:t>
+              <a:t>8</a:t>
             </a:fld>
             <a:endParaRPr lang="en-US" dirty="0"/>
           </a:p>

</xml_diff>